<commit_message>
Add pad and fan classes Add overflow to HeatBuffer Add file name to "Running..." pop-up Update all copyrights
</commit_message>
<xml_diff>
--- a/site/md/graphics-source/vg/energy-budget-layers.pptx
+++ b/site/md/graphics-source/vg/energy-budget-layers.pptx
@@ -9,6 +9,7 @@
     <p:sldId id="257" r:id="rId3"/>
     <p:sldId id="258" r:id="rId4"/>
     <p:sldId id="259" r:id="rId5"/>
+    <p:sldId id="260" r:id="rId6"/>
   </p:sldIdLst>
   <p:sldSz cx="12192000" cy="6858000"/>
   <p:notesSz cx="6858000" cy="9144000"/>
@@ -168,7 +169,7 @@
           </a:lstStyle>
           <a:p>
             <a:r>
-              <a:rPr lang="en-US" smtClean="0"/>
+              <a:rPr lang="en-US"/>
               <a:t>Click to edit Master title style</a:t>
             </a:r>
             <a:endParaRPr lang="en-GB"/>
@@ -233,7 +234,7 @@
           </a:lstStyle>
           <a:p>
             <a:r>
-              <a:rPr lang="en-US" smtClean="0"/>
+              <a:rPr lang="en-US"/>
               <a:t>Click to edit Master subtitle style</a:t>
             </a:r>
             <a:endParaRPr lang="en-GB"/>
@@ -257,7 +258,7 @@
           <a:p>
             <a:fld id="{20D8880A-7215-460A-AE37-B2382C8F388A}" type="datetimeFigureOut">
               <a:rPr lang="en-GB" smtClean="0"/>
-              <a:t>24/02/2023</a:t>
+              <a:t>27/06/2024</a:t>
             </a:fld>
             <a:endParaRPr lang="en-GB"/>
           </a:p>
@@ -351,7 +352,7 @@
           <a:lstStyle/>
           <a:p>
             <a:r>
-              <a:rPr lang="en-US" smtClean="0"/>
+              <a:rPr lang="en-US"/>
               <a:t>Click to edit Master title style</a:t>
             </a:r>
             <a:endParaRPr lang="en-GB"/>
@@ -375,35 +376,35 @@
           <a:p>
             <a:pPr lvl="0"/>
             <a:r>
-              <a:rPr lang="en-US" smtClean="0"/>
+              <a:rPr lang="en-US"/>
               <a:t>Edit Master text styles</a:t>
             </a:r>
           </a:p>
           <a:p>
             <a:pPr lvl="1"/>
             <a:r>
-              <a:rPr lang="en-US" smtClean="0"/>
+              <a:rPr lang="en-US"/>
               <a:t>Second level</a:t>
             </a:r>
           </a:p>
           <a:p>
             <a:pPr lvl="2"/>
             <a:r>
-              <a:rPr lang="en-US" smtClean="0"/>
+              <a:rPr lang="en-US"/>
               <a:t>Third level</a:t>
             </a:r>
           </a:p>
           <a:p>
             <a:pPr lvl="3"/>
             <a:r>
-              <a:rPr lang="en-US" smtClean="0"/>
+              <a:rPr lang="en-US"/>
               <a:t>Fourth level</a:t>
             </a:r>
           </a:p>
           <a:p>
             <a:pPr lvl="4"/>
             <a:r>
-              <a:rPr lang="en-US" smtClean="0"/>
+              <a:rPr lang="en-US"/>
               <a:t>Fifth level</a:t>
             </a:r>
             <a:endParaRPr lang="en-GB"/>
@@ -427,7 +428,7 @@
           <a:p>
             <a:fld id="{20D8880A-7215-460A-AE37-B2382C8F388A}" type="datetimeFigureOut">
               <a:rPr lang="en-GB" smtClean="0"/>
-              <a:t>24/02/2023</a:t>
+              <a:t>27/06/2024</a:t>
             </a:fld>
             <a:endParaRPr lang="en-GB"/>
           </a:p>
@@ -526,7 +527,7 @@
           <a:lstStyle/>
           <a:p>
             <a:r>
-              <a:rPr lang="en-US" smtClean="0"/>
+              <a:rPr lang="en-US"/>
               <a:t>Click to edit Master title style</a:t>
             </a:r>
             <a:endParaRPr lang="en-GB"/>
@@ -555,35 +556,35 @@
           <a:p>
             <a:pPr lvl="0"/>
             <a:r>
-              <a:rPr lang="en-US" smtClean="0"/>
+              <a:rPr lang="en-US"/>
               <a:t>Edit Master text styles</a:t>
             </a:r>
           </a:p>
           <a:p>
             <a:pPr lvl="1"/>
             <a:r>
-              <a:rPr lang="en-US" smtClean="0"/>
+              <a:rPr lang="en-US"/>
               <a:t>Second level</a:t>
             </a:r>
           </a:p>
           <a:p>
             <a:pPr lvl="2"/>
             <a:r>
-              <a:rPr lang="en-US" smtClean="0"/>
+              <a:rPr lang="en-US"/>
               <a:t>Third level</a:t>
             </a:r>
           </a:p>
           <a:p>
             <a:pPr lvl="3"/>
             <a:r>
-              <a:rPr lang="en-US" smtClean="0"/>
+              <a:rPr lang="en-US"/>
               <a:t>Fourth level</a:t>
             </a:r>
           </a:p>
           <a:p>
             <a:pPr lvl="4"/>
             <a:r>
-              <a:rPr lang="en-US" smtClean="0"/>
+              <a:rPr lang="en-US"/>
               <a:t>Fifth level</a:t>
             </a:r>
             <a:endParaRPr lang="en-GB"/>
@@ -607,7 +608,7 @@
           <a:p>
             <a:fld id="{20D8880A-7215-460A-AE37-B2382C8F388A}" type="datetimeFigureOut">
               <a:rPr lang="en-GB" smtClean="0"/>
-              <a:t>24/02/2023</a:t>
+              <a:t>27/06/2024</a:t>
             </a:fld>
             <a:endParaRPr lang="en-GB"/>
           </a:p>
@@ -701,7 +702,7 @@
           <a:lstStyle/>
           <a:p>
             <a:r>
-              <a:rPr lang="en-US" smtClean="0"/>
+              <a:rPr lang="en-US"/>
               <a:t>Click to edit Master title style</a:t>
             </a:r>
             <a:endParaRPr lang="en-GB"/>
@@ -725,35 +726,35 @@
           <a:p>
             <a:pPr lvl="0"/>
             <a:r>
-              <a:rPr lang="en-US" smtClean="0"/>
+              <a:rPr lang="en-US"/>
               <a:t>Edit Master text styles</a:t>
             </a:r>
           </a:p>
           <a:p>
             <a:pPr lvl="1"/>
             <a:r>
-              <a:rPr lang="en-US" smtClean="0"/>
+              <a:rPr lang="en-US"/>
               <a:t>Second level</a:t>
             </a:r>
           </a:p>
           <a:p>
             <a:pPr lvl="2"/>
             <a:r>
-              <a:rPr lang="en-US" smtClean="0"/>
+              <a:rPr lang="en-US"/>
               <a:t>Third level</a:t>
             </a:r>
           </a:p>
           <a:p>
             <a:pPr lvl="3"/>
             <a:r>
-              <a:rPr lang="en-US" smtClean="0"/>
+              <a:rPr lang="en-US"/>
               <a:t>Fourth level</a:t>
             </a:r>
           </a:p>
           <a:p>
             <a:pPr lvl="4"/>
             <a:r>
-              <a:rPr lang="en-US" smtClean="0"/>
+              <a:rPr lang="en-US"/>
               <a:t>Fifth level</a:t>
             </a:r>
             <a:endParaRPr lang="en-GB"/>
@@ -777,7 +778,7 @@
           <a:p>
             <a:fld id="{20D8880A-7215-460A-AE37-B2382C8F388A}" type="datetimeFigureOut">
               <a:rPr lang="en-GB" smtClean="0"/>
-              <a:t>24/02/2023</a:t>
+              <a:t>27/06/2024</a:t>
             </a:fld>
             <a:endParaRPr lang="en-GB"/>
           </a:p>
@@ -880,7 +881,7 @@
           </a:lstStyle>
           <a:p>
             <a:r>
-              <a:rPr lang="en-US" smtClean="0"/>
+              <a:rPr lang="en-US"/>
               <a:t>Click to edit Master title style</a:t>
             </a:r>
             <a:endParaRPr lang="en-GB"/>
@@ -1000,7 +1001,7 @@
           <a:p>
             <a:pPr lvl="0"/>
             <a:r>
-              <a:rPr lang="en-US" smtClean="0"/>
+              <a:rPr lang="en-US"/>
               <a:t>Edit Master text styles</a:t>
             </a:r>
           </a:p>
@@ -1023,7 +1024,7 @@
           <a:p>
             <a:fld id="{20D8880A-7215-460A-AE37-B2382C8F388A}" type="datetimeFigureOut">
               <a:rPr lang="en-GB" smtClean="0"/>
-              <a:t>24/02/2023</a:t>
+              <a:t>27/06/2024</a:t>
             </a:fld>
             <a:endParaRPr lang="en-GB"/>
           </a:p>
@@ -1117,7 +1118,7 @@
           <a:lstStyle/>
           <a:p>
             <a:r>
-              <a:rPr lang="en-US" smtClean="0"/>
+              <a:rPr lang="en-US"/>
               <a:t>Click to edit Master title style</a:t>
             </a:r>
             <a:endParaRPr lang="en-GB"/>
@@ -1146,35 +1147,35 @@
           <a:p>
             <a:pPr lvl="0"/>
             <a:r>
-              <a:rPr lang="en-US" smtClean="0"/>
+              <a:rPr lang="en-US"/>
               <a:t>Edit Master text styles</a:t>
             </a:r>
           </a:p>
           <a:p>
             <a:pPr lvl="1"/>
             <a:r>
-              <a:rPr lang="en-US" smtClean="0"/>
+              <a:rPr lang="en-US"/>
               <a:t>Second level</a:t>
             </a:r>
           </a:p>
           <a:p>
             <a:pPr lvl="2"/>
             <a:r>
-              <a:rPr lang="en-US" smtClean="0"/>
+              <a:rPr lang="en-US"/>
               <a:t>Third level</a:t>
             </a:r>
           </a:p>
           <a:p>
             <a:pPr lvl="3"/>
             <a:r>
-              <a:rPr lang="en-US" smtClean="0"/>
+              <a:rPr lang="en-US"/>
               <a:t>Fourth level</a:t>
             </a:r>
           </a:p>
           <a:p>
             <a:pPr lvl="4"/>
             <a:r>
-              <a:rPr lang="en-US" smtClean="0"/>
+              <a:rPr lang="en-US"/>
               <a:t>Fifth level</a:t>
             </a:r>
             <a:endParaRPr lang="en-GB"/>
@@ -1203,35 +1204,35 @@
           <a:p>
             <a:pPr lvl="0"/>
             <a:r>
-              <a:rPr lang="en-US" smtClean="0"/>
+              <a:rPr lang="en-US"/>
               <a:t>Edit Master text styles</a:t>
             </a:r>
           </a:p>
           <a:p>
             <a:pPr lvl="1"/>
             <a:r>
-              <a:rPr lang="en-US" smtClean="0"/>
+              <a:rPr lang="en-US"/>
               <a:t>Second level</a:t>
             </a:r>
           </a:p>
           <a:p>
             <a:pPr lvl="2"/>
             <a:r>
-              <a:rPr lang="en-US" smtClean="0"/>
+              <a:rPr lang="en-US"/>
               <a:t>Third level</a:t>
             </a:r>
           </a:p>
           <a:p>
             <a:pPr lvl="3"/>
             <a:r>
-              <a:rPr lang="en-US" smtClean="0"/>
+              <a:rPr lang="en-US"/>
               <a:t>Fourth level</a:t>
             </a:r>
           </a:p>
           <a:p>
             <a:pPr lvl="4"/>
             <a:r>
-              <a:rPr lang="en-US" smtClean="0"/>
+              <a:rPr lang="en-US"/>
               <a:t>Fifth level</a:t>
             </a:r>
             <a:endParaRPr lang="en-GB"/>
@@ -1255,7 +1256,7 @@
           <a:p>
             <a:fld id="{20D8880A-7215-460A-AE37-B2382C8F388A}" type="datetimeFigureOut">
               <a:rPr lang="en-GB" smtClean="0"/>
-              <a:t>24/02/2023</a:t>
+              <a:t>27/06/2024</a:t>
             </a:fld>
             <a:endParaRPr lang="en-GB"/>
           </a:p>
@@ -1354,7 +1355,7 @@
           <a:lstStyle/>
           <a:p>
             <a:r>
-              <a:rPr lang="en-US" smtClean="0"/>
+              <a:rPr lang="en-US"/>
               <a:t>Click to edit Master title style</a:t>
             </a:r>
             <a:endParaRPr lang="en-GB"/>
@@ -1420,7 +1421,7 @@
           <a:p>
             <a:pPr lvl="0"/>
             <a:r>
-              <a:rPr lang="en-US" smtClean="0"/>
+              <a:rPr lang="en-US"/>
               <a:t>Edit Master text styles</a:t>
             </a:r>
           </a:p>
@@ -1448,35 +1449,35 @@
           <a:p>
             <a:pPr lvl="0"/>
             <a:r>
-              <a:rPr lang="en-US" smtClean="0"/>
+              <a:rPr lang="en-US"/>
               <a:t>Edit Master text styles</a:t>
             </a:r>
           </a:p>
           <a:p>
             <a:pPr lvl="1"/>
             <a:r>
-              <a:rPr lang="en-US" smtClean="0"/>
+              <a:rPr lang="en-US"/>
               <a:t>Second level</a:t>
             </a:r>
           </a:p>
           <a:p>
             <a:pPr lvl="2"/>
             <a:r>
-              <a:rPr lang="en-US" smtClean="0"/>
+              <a:rPr lang="en-US"/>
               <a:t>Third level</a:t>
             </a:r>
           </a:p>
           <a:p>
             <a:pPr lvl="3"/>
             <a:r>
-              <a:rPr lang="en-US" smtClean="0"/>
+              <a:rPr lang="en-US"/>
               <a:t>Fourth level</a:t>
             </a:r>
           </a:p>
           <a:p>
             <a:pPr lvl="4"/>
             <a:r>
-              <a:rPr lang="en-US" smtClean="0"/>
+              <a:rPr lang="en-US"/>
               <a:t>Fifth level</a:t>
             </a:r>
             <a:endParaRPr lang="en-GB"/>
@@ -1542,7 +1543,7 @@
           <a:p>
             <a:pPr lvl="0"/>
             <a:r>
-              <a:rPr lang="en-US" smtClean="0"/>
+              <a:rPr lang="en-US"/>
               <a:t>Edit Master text styles</a:t>
             </a:r>
           </a:p>
@@ -1570,35 +1571,35 @@
           <a:p>
             <a:pPr lvl="0"/>
             <a:r>
-              <a:rPr lang="en-US" smtClean="0"/>
+              <a:rPr lang="en-US"/>
               <a:t>Edit Master text styles</a:t>
             </a:r>
           </a:p>
           <a:p>
             <a:pPr lvl="1"/>
             <a:r>
-              <a:rPr lang="en-US" smtClean="0"/>
+              <a:rPr lang="en-US"/>
               <a:t>Second level</a:t>
             </a:r>
           </a:p>
           <a:p>
             <a:pPr lvl="2"/>
             <a:r>
-              <a:rPr lang="en-US" smtClean="0"/>
+              <a:rPr lang="en-US"/>
               <a:t>Third level</a:t>
             </a:r>
           </a:p>
           <a:p>
             <a:pPr lvl="3"/>
             <a:r>
-              <a:rPr lang="en-US" smtClean="0"/>
+              <a:rPr lang="en-US"/>
               <a:t>Fourth level</a:t>
             </a:r>
           </a:p>
           <a:p>
             <a:pPr lvl="4"/>
             <a:r>
-              <a:rPr lang="en-US" smtClean="0"/>
+              <a:rPr lang="en-US"/>
               <a:t>Fifth level</a:t>
             </a:r>
             <a:endParaRPr lang="en-GB"/>
@@ -1622,7 +1623,7 @@
           <a:p>
             <a:fld id="{20D8880A-7215-460A-AE37-B2382C8F388A}" type="datetimeFigureOut">
               <a:rPr lang="en-GB" smtClean="0"/>
-              <a:t>24/02/2023</a:t>
+              <a:t>27/06/2024</a:t>
             </a:fld>
             <a:endParaRPr lang="en-GB"/>
           </a:p>
@@ -1716,7 +1717,7 @@
           <a:lstStyle/>
           <a:p>
             <a:r>
-              <a:rPr lang="en-US" smtClean="0"/>
+              <a:rPr lang="en-US"/>
               <a:t>Click to edit Master title style</a:t>
             </a:r>
             <a:endParaRPr lang="en-GB"/>
@@ -1740,7 +1741,7 @@
           <a:p>
             <a:fld id="{20D8880A-7215-460A-AE37-B2382C8F388A}" type="datetimeFigureOut">
               <a:rPr lang="en-GB" smtClean="0"/>
-              <a:t>24/02/2023</a:t>
+              <a:t>27/06/2024</a:t>
             </a:fld>
             <a:endParaRPr lang="en-GB"/>
           </a:p>
@@ -1835,7 +1836,7 @@
           <a:p>
             <a:fld id="{20D8880A-7215-460A-AE37-B2382C8F388A}" type="datetimeFigureOut">
               <a:rPr lang="en-GB" smtClean="0"/>
-              <a:t>24/02/2023</a:t>
+              <a:t>27/06/2024</a:t>
             </a:fld>
             <a:endParaRPr lang="en-GB"/>
           </a:p>
@@ -1938,7 +1939,7 @@
           </a:lstStyle>
           <a:p>
             <a:r>
-              <a:rPr lang="en-US" smtClean="0"/>
+              <a:rPr lang="en-US"/>
               <a:t>Click to edit Master title style</a:t>
             </a:r>
             <a:endParaRPr lang="en-GB"/>
@@ -1995,35 +1996,35 @@
           <a:p>
             <a:pPr lvl="0"/>
             <a:r>
-              <a:rPr lang="en-US" smtClean="0"/>
+              <a:rPr lang="en-US"/>
               <a:t>Edit Master text styles</a:t>
             </a:r>
           </a:p>
           <a:p>
             <a:pPr lvl="1"/>
             <a:r>
-              <a:rPr lang="en-US" smtClean="0"/>
+              <a:rPr lang="en-US"/>
               <a:t>Second level</a:t>
             </a:r>
           </a:p>
           <a:p>
             <a:pPr lvl="2"/>
             <a:r>
-              <a:rPr lang="en-US" smtClean="0"/>
+              <a:rPr lang="en-US"/>
               <a:t>Third level</a:t>
             </a:r>
           </a:p>
           <a:p>
             <a:pPr lvl="3"/>
             <a:r>
-              <a:rPr lang="en-US" smtClean="0"/>
+              <a:rPr lang="en-US"/>
               <a:t>Fourth level</a:t>
             </a:r>
           </a:p>
           <a:p>
             <a:pPr lvl="4"/>
             <a:r>
-              <a:rPr lang="en-US" smtClean="0"/>
+              <a:rPr lang="en-US"/>
               <a:t>Fifth level</a:t>
             </a:r>
             <a:endParaRPr lang="en-GB"/>
@@ -2089,7 +2090,7 @@
           <a:p>
             <a:pPr lvl="0"/>
             <a:r>
-              <a:rPr lang="en-US" smtClean="0"/>
+              <a:rPr lang="en-US"/>
               <a:t>Edit Master text styles</a:t>
             </a:r>
           </a:p>
@@ -2112,7 +2113,7 @@
           <a:p>
             <a:fld id="{20D8880A-7215-460A-AE37-B2382C8F388A}" type="datetimeFigureOut">
               <a:rPr lang="en-GB" smtClean="0"/>
-              <a:t>24/02/2023</a:t>
+              <a:t>27/06/2024</a:t>
             </a:fld>
             <a:endParaRPr lang="en-GB"/>
           </a:p>
@@ -2215,7 +2216,7 @@
           </a:lstStyle>
           <a:p>
             <a:r>
-              <a:rPr lang="en-US" smtClean="0"/>
+              <a:rPr lang="en-US"/>
               <a:t>Click to edit Master title style</a:t>
             </a:r>
             <a:endParaRPr lang="en-GB"/>
@@ -2342,7 +2343,7 @@
           <a:p>
             <a:pPr lvl="0"/>
             <a:r>
-              <a:rPr lang="en-US" smtClean="0"/>
+              <a:rPr lang="en-US"/>
               <a:t>Edit Master text styles</a:t>
             </a:r>
           </a:p>
@@ -2365,7 +2366,7 @@
           <a:p>
             <a:fld id="{20D8880A-7215-460A-AE37-B2382C8F388A}" type="datetimeFigureOut">
               <a:rPr lang="en-GB" smtClean="0"/>
-              <a:t>24/02/2023</a:t>
+              <a:t>27/06/2024</a:t>
             </a:fld>
             <a:endParaRPr lang="en-GB"/>
           </a:p>
@@ -2474,7 +2475,7 @@
           <a:lstStyle/>
           <a:p>
             <a:r>
-              <a:rPr lang="en-US" smtClean="0"/>
+              <a:rPr lang="en-US"/>
               <a:t>Click to edit Master title style</a:t>
             </a:r>
             <a:endParaRPr lang="en-GB"/>
@@ -2508,35 +2509,35 @@
           <a:p>
             <a:pPr lvl="0"/>
             <a:r>
-              <a:rPr lang="en-US" smtClean="0"/>
+              <a:rPr lang="en-US"/>
               <a:t>Edit Master text styles</a:t>
             </a:r>
           </a:p>
           <a:p>
             <a:pPr lvl="1"/>
             <a:r>
-              <a:rPr lang="en-US" smtClean="0"/>
+              <a:rPr lang="en-US"/>
               <a:t>Second level</a:t>
             </a:r>
           </a:p>
           <a:p>
             <a:pPr lvl="2"/>
             <a:r>
-              <a:rPr lang="en-US" smtClean="0"/>
+              <a:rPr lang="en-US"/>
               <a:t>Third level</a:t>
             </a:r>
           </a:p>
           <a:p>
             <a:pPr lvl="3"/>
             <a:r>
-              <a:rPr lang="en-US" smtClean="0"/>
+              <a:rPr lang="en-US"/>
               <a:t>Fourth level</a:t>
             </a:r>
           </a:p>
           <a:p>
             <a:pPr lvl="4"/>
             <a:r>
-              <a:rPr lang="en-US" smtClean="0"/>
+              <a:rPr lang="en-US"/>
               <a:t>Fifth level</a:t>
             </a:r>
             <a:endParaRPr lang="en-GB"/>
@@ -2578,7 +2579,7 @@
           <a:p>
             <a:fld id="{20D8880A-7215-460A-AE37-B2382C8F388A}" type="datetimeFigureOut">
               <a:rPr lang="en-GB" smtClean="0"/>
-              <a:t>24/02/2023</a:t>
+              <a:t>27/06/2024</a:t>
             </a:fld>
             <a:endParaRPr lang="en-GB"/>
           </a:p>
@@ -7865,13 +7866,6 @@
   <p:clrMapOvr>
     <a:masterClrMapping/>
   </p:clrMapOvr>
-  <p:timing>
-    <p:tnLst>
-      <p:par>
-        <p:cTn id="1" dur="indefinite" restart="never" nodeType="tmRoot"/>
-      </p:par>
-    </p:tnLst>
-  </p:timing>
 </p:sld>
 </file>
 
@@ -10756,13 +10750,6 @@
   <p:clrMapOvr>
     <a:masterClrMapping/>
   </p:clrMapOvr>
-  <p:timing>
-    <p:tnLst>
-      <p:par>
-        <p:cTn id="1" dur="indefinite" restart="never" nodeType="tmRoot"/>
-      </p:par>
-    </p:tnLst>
-  </p:timing>
 </p:sld>
 </file>
 
@@ -12926,13 +12913,6 @@
   <p:clrMapOvr>
     <a:masterClrMapping/>
   </p:clrMapOvr>
-  <p:timing>
-    <p:tnLst>
-      <p:par>
-        <p:cTn id="1" dur="indefinite" restart="never" nodeType="tmRoot"/>
-      </p:par>
-    </p:tnLst>
-  </p:timing>
 </p:sld>
 </file>
 
@@ -13215,8 +13195,8 @@
             </p:cxnSp>
           </p:grpSp>
         </p:grpSp>
-        <mc:AlternateContent xmlns:mc="http://schemas.openxmlformats.org/markup-compatibility/2006">
-          <mc:Choice xmlns:a14="http://schemas.microsoft.com/office/drawing/2010/main" Requires="a14">
+        <mc:AlternateContent xmlns:mc="http://schemas.openxmlformats.org/markup-compatibility/2006" xmlns:a14="http://schemas.microsoft.com/office/drawing/2010/main">
+          <mc:Choice Requires="a14">
             <p:sp>
               <p:nvSpPr>
                 <p:cNvPr id="49" name="Rectangle 48"/>
@@ -13284,7 +13264,7 @@
               </p:txBody>
             </p:sp>
           </mc:Choice>
-          <mc:Fallback>
+          <mc:Fallback xmlns="">
             <p:sp>
               <p:nvSpPr>
                 <p:cNvPr id="49" name="Rectangle 48"/>
@@ -13359,8 +13339,8 @@
             </a:fontRef>
           </p:style>
         </p:cxnSp>
-        <mc:AlternateContent xmlns:mc="http://schemas.openxmlformats.org/markup-compatibility/2006">
-          <mc:Choice xmlns:a14="http://schemas.microsoft.com/office/drawing/2010/main" Requires="a14">
+        <mc:AlternateContent xmlns:mc="http://schemas.openxmlformats.org/markup-compatibility/2006" xmlns:a14="http://schemas.microsoft.com/office/drawing/2010/main">
+          <mc:Choice Requires="a14">
             <p:sp>
               <p:nvSpPr>
                 <p:cNvPr id="45" name="Rectangle 44"/>
@@ -13430,7 +13410,7 @@
               </p:txBody>
             </p:sp>
           </mc:Choice>
-          <mc:Fallback>
+          <mc:Fallback xmlns="">
             <p:sp>
               <p:nvSpPr>
                 <p:cNvPr id="45" name="Rectangle 44"/>
@@ -13924,8 +13904,8 @@
             </p:txBody>
           </p:sp>
         </p:grpSp>
-        <mc:AlternateContent xmlns:mc="http://schemas.openxmlformats.org/markup-compatibility/2006">
-          <mc:Choice xmlns:a14="http://schemas.microsoft.com/office/drawing/2010/main" Requires="a14">
+        <mc:AlternateContent xmlns:mc="http://schemas.openxmlformats.org/markup-compatibility/2006" xmlns:a14="http://schemas.microsoft.com/office/drawing/2010/main">
+          <mc:Choice Requires="a14">
             <p:sp>
               <p:nvSpPr>
                 <p:cNvPr id="78" name="Rectangle 77"/>
@@ -13993,7 +13973,7 @@
               </p:txBody>
             </p:sp>
           </mc:Choice>
-          <mc:Fallback>
+          <mc:Fallback xmlns="">
             <p:sp>
               <p:nvSpPr>
                 <p:cNvPr id="78" name="Rectangle 77"/>
@@ -14206,8 +14186,8 @@
             <a:chExt cx="444096" cy="658391"/>
           </a:xfrm>
         </p:grpSpPr>
-        <mc:AlternateContent xmlns:mc="http://schemas.openxmlformats.org/markup-compatibility/2006">
-          <mc:Choice xmlns:a14="http://schemas.microsoft.com/office/drawing/2010/main" Requires="a14">
+        <mc:AlternateContent xmlns:mc="http://schemas.openxmlformats.org/markup-compatibility/2006" xmlns:a14="http://schemas.microsoft.com/office/drawing/2010/main">
+          <mc:Choice Requires="a14">
             <p:sp>
               <p:nvSpPr>
                 <p:cNvPr id="59" name="Rectangle 58"/>
@@ -14269,7 +14249,7 @@
               </p:txBody>
             </p:sp>
           </mc:Choice>
-          <mc:Fallback>
+          <mc:Fallback xmlns="">
             <p:sp>
               <p:nvSpPr>
                 <p:cNvPr id="59" name="Rectangle 58"/>
@@ -14355,13 +14335,888 @@
   <p:clrMapOvr>
     <a:masterClrMapping/>
   </p:clrMapOvr>
-  <p:timing>
-    <p:tnLst>
-      <p:par>
-        <p:cTn id="1" dur="indefinite" restart="never" nodeType="tmRoot"/>
-      </p:par>
-    </p:tnLst>
-  </p:timing>
+</p:sld>
+</file>
+
+<file path=ppt/slides/slide5.xml><?xml version="1.0" encoding="utf-8"?>
+<p:sld xmlns:a="http://schemas.openxmlformats.org/drawingml/2006/main" xmlns:r="http://schemas.openxmlformats.org/officeDocument/2006/relationships" xmlns:p="http://schemas.openxmlformats.org/presentationml/2006/main">
+  <p:cSld>
+    <p:bg>
+      <p:bgPr>
+        <a:solidFill>
+          <a:schemeClr val="bg1">
+            <a:alpha val="79000"/>
+          </a:schemeClr>
+        </a:solidFill>
+        <a:effectLst/>
+      </p:bgPr>
+    </p:bg>
+    <p:spTree>
+      <p:nvGrpSpPr>
+        <p:cNvPr id="1" name=""/>
+        <p:cNvGrpSpPr/>
+        <p:nvPr/>
+      </p:nvGrpSpPr>
+      <p:grpSpPr>
+        <a:xfrm>
+          <a:off x="0" y="0"/>
+          <a:ext cx="0" cy="0"/>
+          <a:chOff x="0" y="0"/>
+          <a:chExt cx="0" cy="0"/>
+        </a:xfrm>
+      </p:grpSpPr>
+      <p:sp>
+        <p:nvSpPr>
+          <p:cNvPr id="43" name="Rectangle 42">
+            <a:extLst>
+              <a:ext uri="{FF2B5EF4-FFF2-40B4-BE49-F238E27FC236}">
+                <a16:creationId xmlns:a16="http://schemas.microsoft.com/office/drawing/2014/main" id="{85A7864D-0A69-9CFB-8E2A-07FEE38913EC}"/>
+              </a:ext>
+            </a:extLst>
+          </p:cNvPr>
+          <p:cNvSpPr/>
+          <p:nvPr/>
+        </p:nvSpPr>
+        <p:spPr>
+          <a:xfrm>
+            <a:off x="2265563" y="4456276"/>
+            <a:ext cx="1446939" cy="419631"/>
+          </a:xfrm>
+          <a:prstGeom prst="rect">
+            <a:avLst/>
+          </a:prstGeom>
+          <a:solidFill>
+            <a:schemeClr val="accent2">
+              <a:lumMod val="75000"/>
+            </a:schemeClr>
+          </a:solidFill>
+          <a:ln>
+            <a:solidFill>
+              <a:schemeClr val="bg1"/>
+            </a:solidFill>
+          </a:ln>
+        </p:spPr>
+        <p:style>
+          <a:lnRef idx="2">
+            <a:schemeClr val="accent1">
+              <a:shade val="15000"/>
+            </a:schemeClr>
+          </a:lnRef>
+          <a:fillRef idx="1">
+            <a:schemeClr val="accent1"/>
+          </a:fillRef>
+          <a:effectRef idx="0">
+            <a:schemeClr val="accent1"/>
+          </a:effectRef>
+          <a:fontRef idx="minor">
+            <a:schemeClr val="lt1"/>
+          </a:fontRef>
+        </p:style>
+        <p:txBody>
+          <a:bodyPr rtlCol="0" anchor="ctr"/>
+          <a:lstStyle/>
+          <a:p>
+            <a:pPr algn="ctr"/>
+            <a:r>
+              <a:rPr lang="en-US" sz="1400" i="1">
+                <a:solidFill>
+                  <a:schemeClr val="tx1"/>
+                </a:solidFill>
+              </a:rPr>
+              <a:t>soil</a:t>
+            </a:r>
+            <a:endParaRPr lang="da-DK" i="1">
+              <a:solidFill>
+                <a:schemeClr val="tx1"/>
+              </a:solidFill>
+            </a:endParaRPr>
+          </a:p>
+        </p:txBody>
+      </p:sp>
+      <p:sp>
+        <p:nvSpPr>
+          <p:cNvPr id="28" name="Rectangle 27">
+            <a:extLst>
+              <a:ext uri="{FF2B5EF4-FFF2-40B4-BE49-F238E27FC236}">
+                <a16:creationId xmlns:a16="http://schemas.microsoft.com/office/drawing/2014/main" id="{B1BE56DC-01C1-C76E-9723-24262A1D4ED1}"/>
+              </a:ext>
+            </a:extLst>
+          </p:cNvPr>
+          <p:cNvSpPr/>
+          <p:nvPr/>
+        </p:nvSpPr>
+        <p:spPr>
+          <a:xfrm>
+            <a:off x="2272797" y="1753972"/>
+            <a:ext cx="1446939" cy="419631"/>
+          </a:xfrm>
+          <a:prstGeom prst="rect">
+            <a:avLst/>
+          </a:prstGeom>
+          <a:solidFill>
+            <a:schemeClr val="accent1">
+              <a:lumMod val="20000"/>
+              <a:lumOff val="80000"/>
+            </a:schemeClr>
+          </a:solidFill>
+          <a:ln>
+            <a:solidFill>
+              <a:schemeClr val="bg1"/>
+            </a:solidFill>
+          </a:ln>
+        </p:spPr>
+        <p:style>
+          <a:lnRef idx="2">
+            <a:schemeClr val="accent1">
+              <a:shade val="15000"/>
+            </a:schemeClr>
+          </a:lnRef>
+          <a:fillRef idx="1">
+            <a:schemeClr val="accent1"/>
+          </a:fillRef>
+          <a:effectRef idx="0">
+            <a:schemeClr val="accent1"/>
+          </a:effectRef>
+          <a:fontRef idx="minor">
+            <a:schemeClr val="lt1"/>
+          </a:fontRef>
+        </p:style>
+        <p:txBody>
+          <a:bodyPr rtlCol="0" anchor="ctr"/>
+          <a:lstStyle/>
+          <a:p>
+            <a:pPr algn="ctr"/>
+            <a:r>
+              <a:rPr lang="en-US" sz="1400" i="1">
+                <a:solidFill>
+                  <a:schemeClr val="tx1"/>
+                </a:solidFill>
+              </a:rPr>
+              <a:t>outdoors</a:t>
+            </a:r>
+            <a:endParaRPr lang="da-DK" i="1">
+              <a:solidFill>
+                <a:schemeClr val="tx1"/>
+              </a:solidFill>
+            </a:endParaRPr>
+          </a:p>
+        </p:txBody>
+      </p:sp>
+      <p:sp>
+        <p:nvSpPr>
+          <p:cNvPr id="27" name="Rectangle 26">
+            <a:extLst>
+              <a:ext uri="{FF2B5EF4-FFF2-40B4-BE49-F238E27FC236}">
+                <a16:creationId xmlns:a16="http://schemas.microsoft.com/office/drawing/2014/main" id="{2B04D37C-4A8B-2D7F-038F-063B2163BD8F}"/>
+              </a:ext>
+            </a:extLst>
+          </p:cNvPr>
+          <p:cNvSpPr/>
+          <p:nvPr/>
+        </p:nvSpPr>
+        <p:spPr>
+          <a:xfrm>
+            <a:off x="2279577" y="2173602"/>
+            <a:ext cx="1446939" cy="2272427"/>
+          </a:xfrm>
+          <a:prstGeom prst="rect">
+            <a:avLst/>
+          </a:prstGeom>
+          <a:solidFill>
+            <a:schemeClr val="bg1">
+              <a:lumMod val="95000"/>
+            </a:schemeClr>
+          </a:solidFill>
+          <a:ln>
+            <a:solidFill>
+              <a:schemeClr val="bg1">
+                <a:lumMod val="95000"/>
+              </a:schemeClr>
+            </a:solidFill>
+          </a:ln>
+        </p:spPr>
+        <p:style>
+          <a:lnRef idx="2">
+            <a:schemeClr val="accent1">
+              <a:shade val="15000"/>
+            </a:schemeClr>
+          </a:lnRef>
+          <a:fillRef idx="1">
+            <a:schemeClr val="accent1"/>
+          </a:fillRef>
+          <a:effectRef idx="0">
+            <a:schemeClr val="accent1"/>
+          </a:effectRef>
+          <a:fontRef idx="minor">
+            <a:schemeClr val="lt1"/>
+          </a:fontRef>
+        </p:style>
+        <p:txBody>
+          <a:bodyPr rtlCol="0" anchor="ctr"/>
+          <a:lstStyle/>
+          <a:p>
+            <a:pPr algn="ctr"/>
+            <a:endParaRPr lang="da-DK"/>
+          </a:p>
+        </p:txBody>
+      </p:sp>
+      <p:sp>
+        <p:nvSpPr>
+          <p:cNvPr id="59" name="Rectangle 58"/>
+          <p:cNvSpPr/>
+          <p:nvPr/>
+        </p:nvSpPr>
+        <p:spPr>
+          <a:xfrm>
+            <a:off x="1860872" y="1628014"/>
+            <a:ext cx="418704" cy="307777"/>
+          </a:xfrm>
+          <a:prstGeom prst="rect">
+            <a:avLst/>
+          </a:prstGeom>
+        </p:spPr>
+        <p:txBody>
+          <a:bodyPr wrap="none">
+            <a:spAutoFit/>
+          </a:bodyPr>
+          <a:lstStyle/>
+          <a:p>
+            <a:pPr algn="r"/>
+            <a:r>
+              <a:rPr lang="en-GB" sz="1400"/>
+              <a:t>sky</a:t>
+            </a:r>
+          </a:p>
+        </p:txBody>
+      </p:sp>
+      <p:sp>
+        <p:nvSpPr>
+          <p:cNvPr id="7" name="Rectangle 6">
+            <a:extLst>
+              <a:ext uri="{FF2B5EF4-FFF2-40B4-BE49-F238E27FC236}">
+                <a16:creationId xmlns:a16="http://schemas.microsoft.com/office/drawing/2014/main" id="{48ED3A70-57CB-4AC9-9136-FA3AD08FC2AE}"/>
+              </a:ext>
+            </a:extLst>
+          </p:cNvPr>
+          <p:cNvSpPr/>
+          <p:nvPr/>
+        </p:nvSpPr>
+        <p:spPr>
+          <a:xfrm>
+            <a:off x="1694929" y="2005919"/>
+            <a:ext cx="584647" cy="307777"/>
+          </a:xfrm>
+          <a:prstGeom prst="rect">
+            <a:avLst/>
+          </a:prstGeom>
+        </p:spPr>
+        <p:txBody>
+          <a:bodyPr wrap="none">
+            <a:spAutoFit/>
+          </a:bodyPr>
+          <a:lstStyle/>
+          <a:p>
+            <a:pPr algn="r"/>
+            <a:r>
+              <a:rPr lang="en-GB" sz="1400"/>
+              <a:t>cover</a:t>
+            </a:r>
+          </a:p>
+        </p:txBody>
+      </p:sp>
+      <p:sp>
+        <p:nvSpPr>
+          <p:cNvPr id="10" name="Rectangle 9">
+            <a:extLst>
+              <a:ext uri="{FF2B5EF4-FFF2-40B4-BE49-F238E27FC236}">
+                <a16:creationId xmlns:a16="http://schemas.microsoft.com/office/drawing/2014/main" id="{5835CC6C-9B73-2BB6-1C44-33D9597B128C}"/>
+              </a:ext>
+            </a:extLst>
+          </p:cNvPr>
+          <p:cNvSpPr/>
+          <p:nvPr/>
+        </p:nvSpPr>
+        <p:spPr>
+          <a:xfrm>
+            <a:off x="1614779" y="2383824"/>
+            <a:ext cx="664797" cy="307777"/>
+          </a:xfrm>
+          <a:prstGeom prst="rect">
+            <a:avLst/>
+          </a:prstGeom>
+        </p:spPr>
+        <p:txBody>
+          <a:bodyPr wrap="none">
+            <a:spAutoFit/>
+          </a:bodyPr>
+          <a:lstStyle/>
+          <a:p>
+            <a:pPr algn="r"/>
+            <a:r>
+              <a:rPr lang="en-GB" sz="1400"/>
+              <a:t>screen</a:t>
+            </a:r>
+          </a:p>
+        </p:txBody>
+      </p:sp>
+      <p:sp>
+        <p:nvSpPr>
+          <p:cNvPr id="13" name="Rectangle 12">
+            <a:extLst>
+              <a:ext uri="{FF2B5EF4-FFF2-40B4-BE49-F238E27FC236}">
+                <a16:creationId xmlns:a16="http://schemas.microsoft.com/office/drawing/2014/main" id="{F2ADC6A0-CD5A-370D-8089-A4140714D266}"/>
+              </a:ext>
+            </a:extLst>
+          </p:cNvPr>
+          <p:cNvSpPr/>
+          <p:nvPr/>
+        </p:nvSpPr>
+        <p:spPr>
+          <a:xfrm>
+            <a:off x="1614779" y="2761729"/>
+            <a:ext cx="664797" cy="307777"/>
+          </a:xfrm>
+          <a:prstGeom prst="rect">
+            <a:avLst/>
+          </a:prstGeom>
+        </p:spPr>
+        <p:txBody>
+          <a:bodyPr wrap="none">
+            <a:spAutoFit/>
+          </a:bodyPr>
+          <a:lstStyle/>
+          <a:p>
+            <a:pPr algn="r"/>
+            <a:r>
+              <a:rPr lang="en-GB" sz="1400"/>
+              <a:t>screen</a:t>
+            </a:r>
+          </a:p>
+        </p:txBody>
+      </p:sp>
+      <p:sp>
+        <p:nvSpPr>
+          <p:cNvPr id="16" name="Rectangle 15">
+            <a:extLst>
+              <a:ext uri="{FF2B5EF4-FFF2-40B4-BE49-F238E27FC236}">
+                <a16:creationId xmlns:a16="http://schemas.microsoft.com/office/drawing/2014/main" id="{1039231F-E620-58B1-9CB3-4094EB4CB15E}"/>
+              </a:ext>
+            </a:extLst>
+          </p:cNvPr>
+          <p:cNvSpPr/>
+          <p:nvPr/>
+        </p:nvSpPr>
+        <p:spPr>
+          <a:xfrm>
+            <a:off x="1210181" y="3139634"/>
+            <a:ext cx="1069395" cy="307777"/>
+          </a:xfrm>
+          <a:prstGeom prst="rect">
+            <a:avLst/>
+          </a:prstGeom>
+        </p:spPr>
+        <p:txBody>
+          <a:bodyPr wrap="none">
+            <a:spAutoFit/>
+          </a:bodyPr>
+          <a:lstStyle/>
+          <a:p>
+            <a:pPr algn="r"/>
+            <a:r>
+              <a:rPr lang="en-GB" sz="1400"/>
+              <a:t>growth light</a:t>
+            </a:r>
+          </a:p>
+        </p:txBody>
+      </p:sp>
+      <p:sp>
+        <p:nvSpPr>
+          <p:cNvPr id="19" name="Rectangle 18">
+            <a:extLst>
+              <a:ext uri="{FF2B5EF4-FFF2-40B4-BE49-F238E27FC236}">
+                <a16:creationId xmlns:a16="http://schemas.microsoft.com/office/drawing/2014/main" id="{B22A89F9-068E-D468-D15A-DCC1FEBFE3B6}"/>
+              </a:ext>
+            </a:extLst>
+          </p:cNvPr>
+          <p:cNvSpPr/>
+          <p:nvPr/>
+        </p:nvSpPr>
+        <p:spPr>
+          <a:xfrm>
+            <a:off x="1770782" y="3517539"/>
+            <a:ext cx="508794" cy="307777"/>
+          </a:xfrm>
+          <a:prstGeom prst="rect">
+            <a:avLst/>
+          </a:prstGeom>
+        </p:spPr>
+        <p:txBody>
+          <a:bodyPr wrap="none">
+            <a:spAutoFit/>
+          </a:bodyPr>
+          <a:lstStyle/>
+          <a:p>
+            <a:pPr algn="r"/>
+            <a:r>
+              <a:rPr lang="en-GB" sz="1400"/>
+              <a:t>crop</a:t>
+            </a:r>
+          </a:p>
+        </p:txBody>
+      </p:sp>
+      <p:sp>
+        <p:nvSpPr>
+          <p:cNvPr id="22" name="Rectangle 21">
+            <a:extLst>
+              <a:ext uri="{FF2B5EF4-FFF2-40B4-BE49-F238E27FC236}">
+                <a16:creationId xmlns:a16="http://schemas.microsoft.com/office/drawing/2014/main" id="{8EDDB9D5-F647-13E6-31E2-445256E6BEF5}"/>
+              </a:ext>
+            </a:extLst>
+          </p:cNvPr>
+          <p:cNvSpPr/>
+          <p:nvPr/>
+        </p:nvSpPr>
+        <p:spPr>
+          <a:xfrm>
+            <a:off x="1404080" y="3895444"/>
+            <a:ext cx="875496" cy="307777"/>
+          </a:xfrm>
+          <a:prstGeom prst="rect">
+            <a:avLst/>
+          </a:prstGeom>
+        </p:spPr>
+        <p:txBody>
+          <a:bodyPr wrap="none">
+            <a:spAutoFit/>
+          </a:bodyPr>
+          <a:lstStyle/>
+          <a:p>
+            <a:pPr algn="r"/>
+            <a:r>
+              <a:rPr lang="en-GB" sz="1400"/>
+              <a:t>heat pipe</a:t>
+            </a:r>
+          </a:p>
+        </p:txBody>
+      </p:sp>
+      <p:cxnSp>
+        <p:nvCxnSpPr>
+          <p:cNvPr id="102" name="Straight Connector 101"/>
+          <p:cNvCxnSpPr>
+            <a:cxnSpLocks/>
+          </p:cNvCxnSpPr>
+          <p:nvPr/>
+        </p:nvCxnSpPr>
+        <p:spPr>
+          <a:xfrm>
+            <a:off x="2279577" y="1791126"/>
+            <a:ext cx="1446939" cy="0"/>
+          </a:xfrm>
+          <a:prstGeom prst="line">
+            <a:avLst/>
+          </a:prstGeom>
+          <a:ln w="60325">
+            <a:solidFill>
+              <a:srgbClr val="257EB8"/>
+            </a:solidFill>
+          </a:ln>
+        </p:spPr>
+        <p:style>
+          <a:lnRef idx="1">
+            <a:schemeClr val="accent1"/>
+          </a:lnRef>
+          <a:fillRef idx="0">
+            <a:schemeClr val="accent1"/>
+          </a:fillRef>
+          <a:effectRef idx="0">
+            <a:schemeClr val="accent1"/>
+          </a:effectRef>
+          <a:fontRef idx="minor">
+            <a:schemeClr val="tx1"/>
+          </a:fontRef>
+        </p:style>
+      </p:cxnSp>
+      <p:sp>
+        <p:nvSpPr>
+          <p:cNvPr id="25" name="Rectangle 24">
+            <a:extLst>
+              <a:ext uri="{FF2B5EF4-FFF2-40B4-BE49-F238E27FC236}">
+                <a16:creationId xmlns:a16="http://schemas.microsoft.com/office/drawing/2014/main" id="{F123093A-8D43-2B89-7087-E2B72217444A}"/>
+              </a:ext>
+            </a:extLst>
+          </p:cNvPr>
+          <p:cNvSpPr/>
+          <p:nvPr/>
+        </p:nvSpPr>
+        <p:spPr>
+          <a:xfrm>
+            <a:off x="1747058" y="4273351"/>
+            <a:ext cx="532518" cy="307777"/>
+          </a:xfrm>
+          <a:prstGeom prst="rect">
+            <a:avLst/>
+          </a:prstGeom>
+        </p:spPr>
+        <p:txBody>
+          <a:bodyPr wrap="none">
+            <a:spAutoFit/>
+          </a:bodyPr>
+          <a:lstStyle/>
+          <a:p>
+            <a:pPr algn="r"/>
+            <a:r>
+              <a:rPr lang="en-GB" sz="1400"/>
+              <a:t>floor</a:t>
+            </a:r>
+          </a:p>
+        </p:txBody>
+      </p:sp>
+      <p:cxnSp>
+        <p:nvCxnSpPr>
+          <p:cNvPr id="32" name="Straight Connector 31">
+            <a:extLst>
+              <a:ext uri="{FF2B5EF4-FFF2-40B4-BE49-F238E27FC236}">
+                <a16:creationId xmlns:a16="http://schemas.microsoft.com/office/drawing/2014/main" id="{0AA2FD05-95FE-56A8-4E49-B263E8065ED4}"/>
+              </a:ext>
+            </a:extLst>
+          </p:cNvPr>
+          <p:cNvCxnSpPr>
+            <a:cxnSpLocks/>
+          </p:cNvCxnSpPr>
+          <p:nvPr/>
+        </p:nvCxnSpPr>
+        <p:spPr>
+          <a:xfrm>
+            <a:off x="2279577" y="2173604"/>
+            <a:ext cx="1446939" cy="0"/>
+          </a:xfrm>
+          <a:prstGeom prst="line">
+            <a:avLst/>
+          </a:prstGeom>
+          <a:ln w="60325">
+            <a:solidFill>
+              <a:srgbClr val="257EB8"/>
+            </a:solidFill>
+          </a:ln>
+        </p:spPr>
+        <p:style>
+          <a:lnRef idx="1">
+            <a:schemeClr val="accent1"/>
+          </a:lnRef>
+          <a:fillRef idx="0">
+            <a:schemeClr val="accent1"/>
+          </a:fillRef>
+          <a:effectRef idx="0">
+            <a:schemeClr val="accent1"/>
+          </a:effectRef>
+          <a:fontRef idx="minor">
+            <a:schemeClr val="tx1"/>
+          </a:fontRef>
+        </p:style>
+      </p:cxnSp>
+      <p:cxnSp>
+        <p:nvCxnSpPr>
+          <p:cNvPr id="33" name="Straight Connector 32">
+            <a:extLst>
+              <a:ext uri="{FF2B5EF4-FFF2-40B4-BE49-F238E27FC236}">
+                <a16:creationId xmlns:a16="http://schemas.microsoft.com/office/drawing/2014/main" id="{FA794122-3172-FE3C-EED9-9041C3BE04E8}"/>
+              </a:ext>
+            </a:extLst>
+          </p:cNvPr>
+          <p:cNvCxnSpPr>
+            <a:cxnSpLocks/>
+          </p:cNvCxnSpPr>
+          <p:nvPr/>
+        </p:nvCxnSpPr>
+        <p:spPr>
+          <a:xfrm>
+            <a:off x="2279577" y="2556082"/>
+            <a:ext cx="1446939" cy="0"/>
+          </a:xfrm>
+          <a:prstGeom prst="line">
+            <a:avLst/>
+          </a:prstGeom>
+          <a:ln w="60325">
+            <a:solidFill>
+              <a:srgbClr val="257EB8"/>
+            </a:solidFill>
+          </a:ln>
+        </p:spPr>
+        <p:style>
+          <a:lnRef idx="1">
+            <a:schemeClr val="accent1"/>
+          </a:lnRef>
+          <a:fillRef idx="0">
+            <a:schemeClr val="accent1"/>
+          </a:fillRef>
+          <a:effectRef idx="0">
+            <a:schemeClr val="accent1"/>
+          </a:effectRef>
+          <a:fontRef idx="minor">
+            <a:schemeClr val="tx1"/>
+          </a:fontRef>
+        </p:style>
+      </p:cxnSp>
+      <p:cxnSp>
+        <p:nvCxnSpPr>
+          <p:cNvPr id="34" name="Straight Connector 33">
+            <a:extLst>
+              <a:ext uri="{FF2B5EF4-FFF2-40B4-BE49-F238E27FC236}">
+                <a16:creationId xmlns:a16="http://schemas.microsoft.com/office/drawing/2014/main" id="{65EA2C04-089A-AC2E-A04C-67EA0001EBC8}"/>
+              </a:ext>
+            </a:extLst>
+          </p:cNvPr>
+          <p:cNvCxnSpPr>
+            <a:cxnSpLocks/>
+          </p:cNvCxnSpPr>
+          <p:nvPr/>
+        </p:nvCxnSpPr>
+        <p:spPr>
+          <a:xfrm>
+            <a:off x="2279577" y="2938560"/>
+            <a:ext cx="1446939" cy="0"/>
+          </a:xfrm>
+          <a:prstGeom prst="line">
+            <a:avLst/>
+          </a:prstGeom>
+          <a:ln w="60325">
+            <a:solidFill>
+              <a:srgbClr val="257EB8"/>
+            </a:solidFill>
+          </a:ln>
+        </p:spPr>
+        <p:style>
+          <a:lnRef idx="1">
+            <a:schemeClr val="accent1"/>
+          </a:lnRef>
+          <a:fillRef idx="0">
+            <a:schemeClr val="accent1"/>
+          </a:fillRef>
+          <a:effectRef idx="0">
+            <a:schemeClr val="accent1"/>
+          </a:effectRef>
+          <a:fontRef idx="minor">
+            <a:schemeClr val="tx1"/>
+          </a:fontRef>
+        </p:style>
+      </p:cxnSp>
+      <p:cxnSp>
+        <p:nvCxnSpPr>
+          <p:cNvPr id="35" name="Straight Connector 34">
+            <a:extLst>
+              <a:ext uri="{FF2B5EF4-FFF2-40B4-BE49-F238E27FC236}">
+                <a16:creationId xmlns:a16="http://schemas.microsoft.com/office/drawing/2014/main" id="{00774257-2370-4890-B5B2-642D72768C63}"/>
+              </a:ext>
+            </a:extLst>
+          </p:cNvPr>
+          <p:cNvCxnSpPr>
+            <a:cxnSpLocks/>
+          </p:cNvCxnSpPr>
+          <p:nvPr/>
+        </p:nvCxnSpPr>
+        <p:spPr>
+          <a:xfrm>
+            <a:off x="2279577" y="3321038"/>
+            <a:ext cx="1446939" cy="0"/>
+          </a:xfrm>
+          <a:prstGeom prst="line">
+            <a:avLst/>
+          </a:prstGeom>
+          <a:ln w="60325">
+            <a:solidFill>
+              <a:srgbClr val="257EB8"/>
+            </a:solidFill>
+          </a:ln>
+        </p:spPr>
+        <p:style>
+          <a:lnRef idx="1">
+            <a:schemeClr val="accent1"/>
+          </a:lnRef>
+          <a:fillRef idx="0">
+            <a:schemeClr val="accent1"/>
+          </a:fillRef>
+          <a:effectRef idx="0">
+            <a:schemeClr val="accent1"/>
+          </a:effectRef>
+          <a:fontRef idx="minor">
+            <a:schemeClr val="tx1"/>
+          </a:fontRef>
+        </p:style>
+      </p:cxnSp>
+      <p:cxnSp>
+        <p:nvCxnSpPr>
+          <p:cNvPr id="36" name="Straight Connector 35">
+            <a:extLst>
+              <a:ext uri="{FF2B5EF4-FFF2-40B4-BE49-F238E27FC236}">
+                <a16:creationId xmlns:a16="http://schemas.microsoft.com/office/drawing/2014/main" id="{A896B2B2-D309-9ADA-379C-CF4B9CC3E673}"/>
+              </a:ext>
+            </a:extLst>
+          </p:cNvPr>
+          <p:cNvCxnSpPr>
+            <a:cxnSpLocks/>
+          </p:cNvCxnSpPr>
+          <p:nvPr/>
+        </p:nvCxnSpPr>
+        <p:spPr>
+          <a:xfrm>
+            <a:off x="2279577" y="3703516"/>
+            <a:ext cx="1446939" cy="0"/>
+          </a:xfrm>
+          <a:prstGeom prst="line">
+            <a:avLst/>
+          </a:prstGeom>
+          <a:ln w="60325">
+            <a:solidFill>
+              <a:srgbClr val="257EB8"/>
+            </a:solidFill>
+          </a:ln>
+        </p:spPr>
+        <p:style>
+          <a:lnRef idx="1">
+            <a:schemeClr val="accent1"/>
+          </a:lnRef>
+          <a:fillRef idx="0">
+            <a:schemeClr val="accent1"/>
+          </a:fillRef>
+          <a:effectRef idx="0">
+            <a:schemeClr val="accent1"/>
+          </a:effectRef>
+          <a:fontRef idx="minor">
+            <a:schemeClr val="tx1"/>
+          </a:fontRef>
+        </p:style>
+      </p:cxnSp>
+      <p:cxnSp>
+        <p:nvCxnSpPr>
+          <p:cNvPr id="37" name="Straight Connector 36">
+            <a:extLst>
+              <a:ext uri="{FF2B5EF4-FFF2-40B4-BE49-F238E27FC236}">
+                <a16:creationId xmlns:a16="http://schemas.microsoft.com/office/drawing/2014/main" id="{10469EC8-234D-BFE3-41EC-646BE472F075}"/>
+              </a:ext>
+            </a:extLst>
+          </p:cNvPr>
+          <p:cNvCxnSpPr>
+            <a:cxnSpLocks/>
+          </p:cNvCxnSpPr>
+          <p:nvPr/>
+        </p:nvCxnSpPr>
+        <p:spPr>
+          <a:xfrm>
+            <a:off x="2279577" y="4085994"/>
+            <a:ext cx="1446939" cy="0"/>
+          </a:xfrm>
+          <a:prstGeom prst="line">
+            <a:avLst/>
+          </a:prstGeom>
+          <a:ln w="60325">
+            <a:solidFill>
+              <a:srgbClr val="257EB8"/>
+            </a:solidFill>
+          </a:ln>
+        </p:spPr>
+        <p:style>
+          <a:lnRef idx="1">
+            <a:schemeClr val="accent1"/>
+          </a:lnRef>
+          <a:fillRef idx="0">
+            <a:schemeClr val="accent1"/>
+          </a:fillRef>
+          <a:effectRef idx="0">
+            <a:schemeClr val="accent1"/>
+          </a:effectRef>
+          <a:fontRef idx="minor">
+            <a:schemeClr val="tx1"/>
+          </a:fontRef>
+        </p:style>
+      </p:cxnSp>
+      <p:cxnSp>
+        <p:nvCxnSpPr>
+          <p:cNvPr id="38" name="Straight Connector 37">
+            <a:extLst>
+              <a:ext uri="{FF2B5EF4-FFF2-40B4-BE49-F238E27FC236}">
+                <a16:creationId xmlns:a16="http://schemas.microsoft.com/office/drawing/2014/main" id="{2D8AAC76-0DA3-70F4-C624-9B287AC486E3}"/>
+              </a:ext>
+            </a:extLst>
+          </p:cNvPr>
+          <p:cNvCxnSpPr>
+            <a:cxnSpLocks/>
+          </p:cNvCxnSpPr>
+          <p:nvPr/>
+        </p:nvCxnSpPr>
+        <p:spPr>
+          <a:xfrm>
+            <a:off x="2279577" y="4468470"/>
+            <a:ext cx="1446939" cy="0"/>
+          </a:xfrm>
+          <a:prstGeom prst="line">
+            <a:avLst/>
+          </a:prstGeom>
+          <a:ln w="60325">
+            <a:solidFill>
+              <a:srgbClr val="257EB8"/>
+            </a:solidFill>
+          </a:ln>
+        </p:spPr>
+        <p:style>
+          <a:lnRef idx="1">
+            <a:schemeClr val="accent1"/>
+          </a:lnRef>
+          <a:fillRef idx="0">
+            <a:schemeClr val="accent1"/>
+          </a:fillRef>
+          <a:effectRef idx="0">
+            <a:schemeClr val="accent1"/>
+          </a:effectRef>
+          <a:fontRef idx="minor">
+            <a:schemeClr val="tx1"/>
+          </a:fontRef>
+        </p:style>
+      </p:cxnSp>
+      <p:sp>
+        <p:nvSpPr>
+          <p:cNvPr id="41" name="Rectangle 40">
+            <a:extLst>
+              <a:ext uri="{FF2B5EF4-FFF2-40B4-BE49-F238E27FC236}">
+                <a16:creationId xmlns:a16="http://schemas.microsoft.com/office/drawing/2014/main" id="{10DFA670-A9AD-F175-A71D-904EF351C028}"/>
+              </a:ext>
+            </a:extLst>
+          </p:cNvPr>
+          <p:cNvSpPr/>
+          <p:nvPr/>
+        </p:nvSpPr>
+        <p:spPr>
+          <a:xfrm>
+            <a:off x="2639805" y="2996952"/>
+            <a:ext cx="726482" cy="307777"/>
+          </a:xfrm>
+          <a:prstGeom prst="rect">
+            <a:avLst/>
+          </a:prstGeom>
+        </p:spPr>
+        <p:txBody>
+          <a:bodyPr wrap="none">
+            <a:spAutoFit/>
+          </a:bodyPr>
+          <a:lstStyle/>
+          <a:p>
+            <a:pPr algn="r"/>
+            <a:r>
+              <a:rPr lang="en-GB" sz="1400" i="1"/>
+              <a:t>indoors</a:t>
+            </a:r>
+          </a:p>
+        </p:txBody>
+      </p:sp>
+    </p:spTree>
+    <p:extLst>
+      <p:ext uri="{BB962C8B-B14F-4D97-AF65-F5344CB8AC3E}">
+        <p14:creationId xmlns:p14="http://schemas.microsoft.com/office/powerpoint/2010/main" val="2281126227"/>
+      </p:ext>
+    </p:extLst>
+  </p:cSld>
+  <p:clrMapOvr>
+    <a:masterClrMapping/>
+  </p:clrMapOvr>
 </p:sld>
 </file>
 

</xml_diff>